<commit_message>
feat: interface with get user info by ids and filter
</commit_message>
<xml_diff>
--- a/组会/第二次答辩材料/后端架构展示图.pptx
+++ b/组会/第二次答辩材料/后端架构展示图.pptx
@@ -5,12 +5,10 @@
     <p:sldMasterId id="2147483648" r:id="rId1"/>
   </p:sldMasterIdLst>
   <p:notesMasterIdLst>
-    <p:notesMasterId r:id="rId5"/>
+    <p:notesMasterId r:id="rId3"/>
   </p:notesMasterIdLst>
   <p:sldIdLst>
-    <p:sldId id="257" r:id="rId2"/>
-    <p:sldId id="256" r:id="rId3"/>
-    <p:sldId id="259" r:id="rId4"/>
+    <p:sldId id="256" r:id="rId2"/>
   </p:sldIdLst>
   <p:sldSz cx="12192000" cy="6858000"/>
   <p:notesSz cx="6858000" cy="9144000"/>
@@ -464,90 +462,6 @@
     </a:lvl9pPr>
   </p:notesStyle>
 </p:notesMaster>
-</file>
-
-<file path=ppt/notesSlides/notesSlide1.xml><?xml version="1.0" encoding="utf-8"?>
-<p:notes xmlns:a="http://schemas.openxmlformats.org/drawingml/2006/main" xmlns:r="http://schemas.openxmlformats.org/officeDocument/2006/relationships" xmlns:p="http://schemas.openxmlformats.org/presentationml/2006/main">
-  <p:cSld>
-    <p:spTree>
-      <p:nvGrpSpPr>
-        <p:cNvPr id="1" name=""/>
-        <p:cNvGrpSpPr/>
-        <p:nvPr/>
-      </p:nvGrpSpPr>
-      <p:grpSpPr>
-        <a:xfrm>
-          <a:off x="0" y="0"/>
-          <a:ext cx="0" cy="0"/>
-          <a:chOff x="0" y="0"/>
-          <a:chExt cx="0" cy="0"/>
-        </a:xfrm>
-      </p:grpSpPr>
-      <p:sp>
-        <p:nvSpPr>
-          <p:cNvPr id="2" name="幻灯片图像占位符 1"/>
-          <p:cNvSpPr>
-            <a:spLocks noGrp="1" noRot="1" noChangeAspect="1"/>
-          </p:cNvSpPr>
-          <p:nvPr>
-            <p:ph type="sldImg"/>
-          </p:nvPr>
-        </p:nvSpPr>
-        <p:spPr/>
-      </p:sp>
-      <p:sp>
-        <p:nvSpPr>
-          <p:cNvPr id="3" name="备注占位符 2"/>
-          <p:cNvSpPr>
-            <a:spLocks noGrp="1"/>
-          </p:cNvSpPr>
-          <p:nvPr>
-            <p:ph type="body" idx="1"/>
-          </p:nvPr>
-        </p:nvSpPr>
-        <p:spPr/>
-        <p:txBody>
-          <a:bodyPr/>
-          <a:lstStyle/>
-          <a:p>
-            <a:endParaRPr lang="zh-CN" altLang="en-US" dirty="0"/>
-          </a:p>
-        </p:txBody>
-      </p:sp>
-      <p:sp>
-        <p:nvSpPr>
-          <p:cNvPr id="4" name="灯片编号占位符 3"/>
-          <p:cNvSpPr>
-            <a:spLocks noGrp="1"/>
-          </p:cNvSpPr>
-          <p:nvPr>
-            <p:ph type="sldNum" sz="quarter" idx="5"/>
-          </p:nvPr>
-        </p:nvSpPr>
-        <p:spPr/>
-        <p:txBody>
-          <a:bodyPr/>
-          <a:lstStyle/>
-          <a:p>
-            <a:fld id="{250287D2-2474-4C81-946A-628AEFD1DB4E}" type="slidenum">
-              <a:rPr lang="zh-CN" altLang="en-US" smtClean="0"/>
-              <a:t>1</a:t>
-            </a:fld>
-            <a:endParaRPr lang="zh-CN" altLang="en-US"/>
-          </a:p>
-        </p:txBody>
-      </p:sp>
-    </p:spTree>
-    <p:extLst>
-      <p:ext uri="{BB962C8B-B14F-4D97-AF65-F5344CB8AC3E}">
-        <p14:creationId xmlns:p14="http://schemas.microsoft.com/office/powerpoint/2010/main" val="3394157681"/>
-      </p:ext>
-    </p:extLst>
-  </p:cSld>
-  <p:clrMapOvr>
-    <a:masterClrMapping/>
-  </p:clrMapOvr>
-</p:notes>
 </file>
 
 <file path=ppt/slideLayouts/slideLayout1.xml><?xml version="1.0" encoding="utf-8"?>
@@ -3748,304 +3662,6 @@
 </file>
 
 <file path=ppt/slides/slide1.xml><?xml version="1.0" encoding="utf-8"?>
-<p:sld xmlns:a="http://schemas.openxmlformats.org/drawingml/2006/main" xmlns:r="http://schemas.openxmlformats.org/officeDocument/2006/relationships" xmlns:p="http://schemas.openxmlformats.org/presentationml/2006/main">
-  <p:cSld>
-    <p:spTree>
-      <p:nvGrpSpPr>
-        <p:cNvPr id="1" name=""/>
-        <p:cNvGrpSpPr/>
-        <p:nvPr/>
-      </p:nvGrpSpPr>
-      <p:grpSpPr>
-        <a:xfrm>
-          <a:off x="0" y="0"/>
-          <a:ext cx="0" cy="0"/>
-          <a:chOff x="0" y="0"/>
-          <a:chExt cx="0" cy="0"/>
-        </a:xfrm>
-      </p:grpSpPr>
-      <p:sp>
-        <p:nvSpPr>
-          <p:cNvPr id="2" name="标题 1">
-            <a:extLst>
-              <a:ext uri="{FF2B5EF4-FFF2-40B4-BE49-F238E27FC236}">
-                <a16:creationId xmlns:a16="http://schemas.microsoft.com/office/drawing/2014/main" id="{A731DE57-A93D-4ED3-A7B8-2E11CADAC1DC}"/>
-              </a:ext>
-            </a:extLst>
-          </p:cNvPr>
-          <p:cNvSpPr>
-            <a:spLocks noGrp="1"/>
-          </p:cNvSpPr>
-          <p:nvPr>
-            <p:ph type="title"/>
-          </p:nvPr>
-        </p:nvSpPr>
-        <p:spPr>
-          <a:xfrm>
-            <a:off x="838200" y="329614"/>
-            <a:ext cx="10515600" cy="1325563"/>
-          </a:xfrm>
-        </p:spPr>
-        <p:txBody>
-          <a:bodyPr/>
-          <a:lstStyle/>
-          <a:p>
-            <a:pPr>
-              <a:spcBef>
-                <a:spcPts val="600"/>
-              </a:spcBef>
-            </a:pPr>
-            <a:r>
-              <a:rPr lang="zh-CN" altLang="en-US" b="1" dirty="0">
-                <a:solidFill>
-                  <a:srgbClr val="00B0F0"/>
-                </a:solidFill>
-                <a:effectLst>
-                  <a:outerShdw blurRad="38100" dist="38100" dir="2700000" algn="tl">
-                    <a:srgbClr val="000000">
-                      <a:alpha val="43137"/>
-                    </a:srgbClr>
-                  </a:outerShdw>
-                </a:effectLst>
-                <a:latin typeface="幼圆" panose="02010509060101010101" pitchFamily="49" charset="-122"/>
-                <a:ea typeface="幼圆" panose="02010509060101010101" pitchFamily="49" charset="-122"/>
-              </a:rPr>
-              <a:t>高性能、高可用场景带来的挑战</a:t>
-            </a:r>
-          </a:p>
-        </p:txBody>
-      </p:sp>
-      <p:sp>
-        <p:nvSpPr>
-          <p:cNvPr id="3" name="内容占位符 2">
-            <a:extLst>
-              <a:ext uri="{FF2B5EF4-FFF2-40B4-BE49-F238E27FC236}">
-                <a16:creationId xmlns:a16="http://schemas.microsoft.com/office/drawing/2014/main" id="{05D8C1C2-E960-4E6D-B147-7B1A32540C6F}"/>
-              </a:ext>
-            </a:extLst>
-          </p:cNvPr>
-          <p:cNvSpPr>
-            <a:spLocks noGrp="1"/>
-          </p:cNvSpPr>
-          <p:nvPr>
-            <p:ph idx="1"/>
-          </p:nvPr>
-        </p:nvSpPr>
-        <p:spPr>
-          <a:xfrm>
-            <a:off x="838200" y="2041863"/>
-            <a:ext cx="10515600" cy="3728622"/>
-          </a:xfrm>
-        </p:spPr>
-        <p:txBody>
-          <a:bodyPr vert="horz" lIns="91440" tIns="45720" rIns="91440" bIns="45720" rtlCol="0" anchor="ctr">
-            <a:normAutofit fontScale="85000" lnSpcReduction="10000"/>
-          </a:bodyPr>
-          <a:lstStyle/>
-          <a:p>
-            <a:pPr>
-              <a:lnSpc>
-                <a:spcPct val="180000"/>
-              </a:lnSpc>
-              <a:spcBef>
-                <a:spcPct val="0"/>
-              </a:spcBef>
-            </a:pPr>
-            <a:r>
-              <a:rPr lang="zh-CN" altLang="en-US" dirty="0">
-                <a:solidFill>
-                  <a:srgbClr val="00B0F0"/>
-                </a:solidFill>
-                <a:latin typeface="幼圆" panose="02010509060101010101" pitchFamily="49" charset="-122"/>
-                <a:ea typeface="幼圆" panose="02010509060101010101" pitchFamily="49" charset="-122"/>
-                <a:cs typeface="+mj-cs"/>
-              </a:rPr>
-              <a:t>如何快速管理、部署服务，满足高性能、低延时的要求？</a:t>
-            </a:r>
-            <a:endParaRPr lang="en-US" altLang="zh-CN" dirty="0">
-              <a:solidFill>
-                <a:srgbClr val="00B0F0"/>
-              </a:solidFill>
-              <a:latin typeface="幼圆" panose="02010509060101010101" pitchFamily="49" charset="-122"/>
-              <a:ea typeface="幼圆" panose="02010509060101010101" pitchFamily="49" charset="-122"/>
-              <a:cs typeface="+mj-cs"/>
-            </a:endParaRPr>
-          </a:p>
-          <a:p>
-            <a:pPr>
-              <a:lnSpc>
-                <a:spcPct val="180000"/>
-              </a:lnSpc>
-              <a:spcBef>
-                <a:spcPct val="0"/>
-              </a:spcBef>
-            </a:pPr>
-            <a:r>
-              <a:rPr lang="zh-CN" altLang="en-US" dirty="0">
-                <a:solidFill>
-                  <a:srgbClr val="00B0F0"/>
-                </a:solidFill>
-                <a:latin typeface="幼圆" panose="02010509060101010101" pitchFamily="49" charset="-122"/>
-                <a:ea typeface="幼圆" panose="02010509060101010101" pitchFamily="49" charset="-122"/>
-                <a:cs typeface="+mj-cs"/>
-              </a:rPr>
-              <a:t>如何保证服务的高可用性？</a:t>
-            </a:r>
-            <a:endParaRPr lang="en-US" altLang="zh-CN" dirty="0">
-              <a:solidFill>
-                <a:srgbClr val="00B0F0"/>
-              </a:solidFill>
-              <a:latin typeface="幼圆" panose="02010509060101010101" pitchFamily="49" charset="-122"/>
-              <a:ea typeface="幼圆" panose="02010509060101010101" pitchFamily="49" charset="-122"/>
-              <a:cs typeface="+mj-cs"/>
-            </a:endParaRPr>
-          </a:p>
-          <a:p>
-            <a:pPr>
-              <a:lnSpc>
-                <a:spcPct val="180000"/>
-              </a:lnSpc>
-              <a:spcBef>
-                <a:spcPct val="0"/>
-              </a:spcBef>
-            </a:pPr>
-            <a:r>
-              <a:rPr lang="zh-CN" altLang="en-US" dirty="0">
-                <a:solidFill>
-                  <a:srgbClr val="00B0F0"/>
-                </a:solidFill>
-                <a:latin typeface="幼圆" panose="02010509060101010101" pitchFamily="49" charset="-122"/>
-                <a:ea typeface="幼圆" panose="02010509060101010101" pitchFamily="49" charset="-122"/>
-                <a:cs typeface="+mj-cs"/>
-              </a:rPr>
-              <a:t>如何在大数据、人工智能等高性能场景下完成高并发挑战？</a:t>
-            </a:r>
-            <a:endParaRPr lang="en-US" altLang="zh-CN" dirty="0">
-              <a:solidFill>
-                <a:srgbClr val="00B0F0"/>
-              </a:solidFill>
-              <a:latin typeface="幼圆" panose="02010509060101010101" pitchFamily="49" charset="-122"/>
-              <a:ea typeface="幼圆" panose="02010509060101010101" pitchFamily="49" charset="-122"/>
-              <a:cs typeface="+mj-cs"/>
-            </a:endParaRPr>
-          </a:p>
-          <a:p>
-            <a:pPr>
-              <a:lnSpc>
-                <a:spcPct val="180000"/>
-              </a:lnSpc>
-              <a:spcBef>
-                <a:spcPct val="0"/>
-              </a:spcBef>
-            </a:pPr>
-            <a:r>
-              <a:rPr lang="zh-CN" altLang="en-US" dirty="0">
-                <a:solidFill>
-                  <a:srgbClr val="00B0F0"/>
-                </a:solidFill>
-                <a:latin typeface="幼圆" panose="02010509060101010101" pitchFamily="49" charset="-122"/>
-                <a:ea typeface="幼圆" panose="02010509060101010101" pitchFamily="49" charset="-122"/>
-                <a:cs typeface="+mj-cs"/>
-              </a:rPr>
-              <a:t>如何监控服务数据、快速解决故障点？</a:t>
-            </a:r>
-            <a:endParaRPr lang="en-US" altLang="zh-CN" dirty="0">
-              <a:solidFill>
-                <a:srgbClr val="00B0F0"/>
-              </a:solidFill>
-              <a:latin typeface="幼圆" panose="02010509060101010101" pitchFamily="49" charset="-122"/>
-              <a:ea typeface="幼圆" panose="02010509060101010101" pitchFamily="49" charset="-122"/>
-              <a:cs typeface="+mj-cs"/>
-            </a:endParaRPr>
-          </a:p>
-          <a:p>
-            <a:pPr>
-              <a:lnSpc>
-                <a:spcPct val="180000"/>
-              </a:lnSpc>
-              <a:spcBef>
-                <a:spcPct val="0"/>
-              </a:spcBef>
-            </a:pPr>
-            <a:r>
-              <a:rPr lang="zh-CN" altLang="en-US" dirty="0">
-                <a:solidFill>
-                  <a:srgbClr val="00B0F0"/>
-                </a:solidFill>
-                <a:latin typeface="幼圆" panose="02010509060101010101" pitchFamily="49" charset="-122"/>
-                <a:ea typeface="幼圆" panose="02010509060101010101" pitchFamily="49" charset="-122"/>
-                <a:cs typeface="+mj-cs"/>
-              </a:rPr>
-              <a:t>如何实现服务自动扩缩容和服务降级，实现服务弹性、节省计算成本？</a:t>
-            </a:r>
-            <a:endParaRPr lang="en-US" altLang="zh-CN" dirty="0">
-              <a:solidFill>
-                <a:srgbClr val="00B0F0"/>
-              </a:solidFill>
-              <a:latin typeface="幼圆" panose="02010509060101010101" pitchFamily="49" charset="-122"/>
-              <a:ea typeface="幼圆" panose="02010509060101010101" pitchFamily="49" charset="-122"/>
-              <a:cs typeface="+mj-cs"/>
-            </a:endParaRPr>
-          </a:p>
-          <a:p>
-            <a:pPr>
-              <a:lnSpc>
-                <a:spcPct val="180000"/>
-              </a:lnSpc>
-              <a:spcBef>
-                <a:spcPct val="0"/>
-              </a:spcBef>
-            </a:pPr>
-            <a:r>
-              <a:rPr lang="zh-CN" altLang="en-US" dirty="0">
-                <a:solidFill>
-                  <a:srgbClr val="00B0F0"/>
-                </a:solidFill>
-                <a:latin typeface="幼圆" panose="02010509060101010101" pitchFamily="49" charset="-122"/>
-                <a:ea typeface="幼圆" panose="02010509060101010101" pitchFamily="49" charset="-122"/>
-                <a:cs typeface="+mj-cs"/>
-              </a:rPr>
-              <a:t>如何节省运维成本，快速 </a:t>
-            </a:r>
-            <a:r>
-              <a:rPr lang="en-US" altLang="zh-CN" dirty="0">
-                <a:solidFill>
-                  <a:srgbClr val="00B0F0"/>
-                </a:solidFill>
-                <a:latin typeface="幼圆" panose="02010509060101010101" pitchFamily="49" charset="-122"/>
-                <a:ea typeface="幼圆" panose="02010509060101010101" pitchFamily="49" charset="-122"/>
-                <a:cs typeface="+mj-cs"/>
-              </a:rPr>
-              <a:t>CI/CD</a:t>
-            </a:r>
-            <a:r>
-              <a:rPr lang="zh-CN" altLang="en-US" dirty="0">
-                <a:solidFill>
-                  <a:srgbClr val="00B0F0"/>
-                </a:solidFill>
-                <a:latin typeface="幼圆" panose="02010509060101010101" pitchFamily="49" charset="-122"/>
-                <a:ea typeface="幼圆" panose="02010509060101010101" pitchFamily="49" charset="-122"/>
-                <a:cs typeface="+mj-cs"/>
-              </a:rPr>
-              <a:t>，构造稳定的处理流程</a:t>
-            </a:r>
-          </a:p>
-        </p:txBody>
-      </p:sp>
-    </p:spTree>
-    <p:extLst>
-      <p:ext uri="{BB962C8B-B14F-4D97-AF65-F5344CB8AC3E}">
-        <p14:creationId xmlns:p14="http://schemas.microsoft.com/office/powerpoint/2010/main" val="3703176817"/>
-      </p:ext>
-    </p:extLst>
-  </p:cSld>
-  <p:clrMapOvr>
-    <a:masterClrMapping/>
-  </p:clrMapOvr>
-</p:sld>
-</file>
-
-<file path=ppt/slides/slide2.xml><?xml version="1.0" encoding="utf-8"?>
 <p:sld xmlns:a="http://schemas.openxmlformats.org/drawingml/2006/main" xmlns:r="http://schemas.openxmlformats.org/officeDocument/2006/relationships" xmlns:p="http://schemas.openxmlformats.org/presentationml/2006/main">
   <p:cSld>
     <p:spTree>
@@ -5358,417 +4974,6 @@
     <p:extLst>
       <p:ext uri="{BB962C8B-B14F-4D97-AF65-F5344CB8AC3E}">
         <p14:creationId xmlns:p14="http://schemas.microsoft.com/office/powerpoint/2010/main" val="3431543081"/>
-      </p:ext>
-    </p:extLst>
-  </p:cSld>
-  <p:clrMapOvr>
-    <a:masterClrMapping/>
-  </p:clrMapOvr>
-</p:sld>
-</file>
-
-<file path=ppt/slides/slide3.xml><?xml version="1.0" encoding="utf-8"?>
-<p:sld xmlns:a="http://schemas.openxmlformats.org/drawingml/2006/main" xmlns:r="http://schemas.openxmlformats.org/officeDocument/2006/relationships" xmlns:p="http://schemas.openxmlformats.org/presentationml/2006/main">
-  <p:cSld>
-    <p:spTree>
-      <p:nvGrpSpPr>
-        <p:cNvPr id="1" name=""/>
-        <p:cNvGrpSpPr/>
-        <p:nvPr/>
-      </p:nvGrpSpPr>
-      <p:grpSpPr>
-        <a:xfrm>
-          <a:off x="0" y="0"/>
-          <a:ext cx="0" cy="0"/>
-          <a:chOff x="0" y="0"/>
-          <a:chExt cx="0" cy="0"/>
-        </a:xfrm>
-      </p:grpSpPr>
-      <p:sp>
-        <p:nvSpPr>
-          <p:cNvPr id="2" name="标题 1">
-            <a:extLst>
-              <a:ext uri="{FF2B5EF4-FFF2-40B4-BE49-F238E27FC236}">
-                <a16:creationId xmlns:a16="http://schemas.microsoft.com/office/drawing/2014/main" id="{A731DE57-A93D-4ED3-A7B8-2E11CADAC1DC}"/>
-              </a:ext>
-            </a:extLst>
-          </p:cNvPr>
-          <p:cNvSpPr>
-            <a:spLocks noGrp="1"/>
-          </p:cNvSpPr>
-          <p:nvPr>
-            <p:ph type="title"/>
-          </p:nvPr>
-        </p:nvSpPr>
-        <p:spPr>
-          <a:xfrm>
-            <a:off x="838200" y="453137"/>
-            <a:ext cx="10515600" cy="1325563"/>
-          </a:xfrm>
-        </p:spPr>
-        <p:txBody>
-          <a:bodyPr/>
-          <a:lstStyle/>
-          <a:p>
-            <a:r>
-              <a:rPr lang="zh-CN" altLang="en-US" b="1" dirty="0">
-                <a:solidFill>
-                  <a:srgbClr val="00B0F0"/>
-                </a:solidFill>
-                <a:effectLst>
-                  <a:outerShdw blurRad="38100" dist="38100" dir="2700000" algn="tl">
-                    <a:srgbClr val="000000">
-                      <a:alpha val="43137"/>
-                    </a:srgbClr>
-                  </a:outerShdw>
-                </a:effectLst>
-                <a:latin typeface="幼圆" panose="02010509060101010101" pitchFamily="49" charset="-122"/>
-                <a:ea typeface="幼圆" panose="02010509060101010101" pitchFamily="49" charset="-122"/>
-              </a:rPr>
-              <a:t>我们还有很多工作 </a:t>
-            </a:r>
-            <a:r>
-              <a:rPr lang="en-US" altLang="zh-CN" b="1" dirty="0">
-                <a:solidFill>
-                  <a:srgbClr val="00B0F0"/>
-                </a:solidFill>
-                <a:effectLst>
-                  <a:outerShdw blurRad="38100" dist="38100" dir="2700000" algn="tl">
-                    <a:srgbClr val="000000">
-                      <a:alpha val="43137"/>
-                    </a:srgbClr>
-                  </a:outerShdw>
-                </a:effectLst>
-                <a:latin typeface="幼圆" panose="02010509060101010101" pitchFamily="49" charset="-122"/>
-                <a:ea typeface="幼圆" panose="02010509060101010101" pitchFamily="49" charset="-122"/>
-              </a:rPr>
-              <a:t>…</a:t>
-            </a:r>
-            <a:endParaRPr lang="zh-CN" altLang="en-US" b="1" dirty="0">
-              <a:solidFill>
-                <a:srgbClr val="00B0F0"/>
-              </a:solidFill>
-              <a:effectLst>
-                <a:outerShdw blurRad="38100" dist="38100" dir="2700000" algn="tl">
-                  <a:srgbClr val="000000">
-                    <a:alpha val="43137"/>
-                  </a:srgbClr>
-                </a:outerShdw>
-              </a:effectLst>
-              <a:latin typeface="幼圆" panose="02010509060101010101" pitchFamily="49" charset="-122"/>
-              <a:ea typeface="幼圆" panose="02010509060101010101" pitchFamily="49" charset="-122"/>
-            </a:endParaRPr>
-          </a:p>
-        </p:txBody>
-      </p:sp>
-      <p:sp>
-        <p:nvSpPr>
-          <p:cNvPr id="4" name="内容占位符 2">
-            <a:extLst>
-              <a:ext uri="{FF2B5EF4-FFF2-40B4-BE49-F238E27FC236}">
-                <a16:creationId xmlns:a16="http://schemas.microsoft.com/office/drawing/2014/main" id="{A249E150-055A-4FF7-B9DB-983C739F25D2}"/>
-              </a:ext>
-            </a:extLst>
-          </p:cNvPr>
-          <p:cNvSpPr txBox="1">
-            <a:spLocks/>
-          </p:cNvSpPr>
-          <p:nvPr/>
-        </p:nvSpPr>
-        <p:spPr>
-          <a:xfrm>
-            <a:off x="838200" y="2020934"/>
-            <a:ext cx="10515600" cy="2595454"/>
-          </a:xfrm>
-          <a:prstGeom prst="rect">
-            <a:avLst/>
-          </a:prstGeom>
-        </p:spPr>
-        <p:txBody>
-          <a:bodyPr vert="horz" lIns="91440" tIns="45720" rIns="91440" bIns="45720" rtlCol="0">
-            <a:normAutofit/>
-          </a:bodyPr>
-          <a:lstStyle>
-            <a:lvl1pPr marL="228600" indent="-228600" algn="l" defTabSz="914400" rtl="0" eaLnBrk="1" latinLnBrk="0" hangingPunct="1">
-              <a:lnSpc>
-                <a:spcPct val="90000"/>
-              </a:lnSpc>
-              <a:spcBef>
-                <a:spcPts val="1000"/>
-              </a:spcBef>
-              <a:buFont typeface="Arial" panose="020B0604020202020204" pitchFamily="34" charset="0"/>
-              <a:buChar char="•"/>
-              <a:defRPr sz="2800" kern="1200">
-                <a:solidFill>
-                  <a:schemeClr val="tx1"/>
-                </a:solidFill>
-                <a:latin typeface="+mn-lt"/>
-                <a:ea typeface="+mn-ea"/>
-                <a:cs typeface="+mn-cs"/>
-              </a:defRPr>
-            </a:lvl1pPr>
-            <a:lvl2pPr marL="685800" indent="-228600" algn="l" defTabSz="914400" rtl="0" eaLnBrk="1" latinLnBrk="0" hangingPunct="1">
-              <a:lnSpc>
-                <a:spcPct val="90000"/>
-              </a:lnSpc>
-              <a:spcBef>
-                <a:spcPts val="500"/>
-              </a:spcBef>
-              <a:buFont typeface="Arial" panose="020B0604020202020204" pitchFamily="34" charset="0"/>
-              <a:buChar char="•"/>
-              <a:defRPr sz="2400" kern="1200">
-                <a:solidFill>
-                  <a:schemeClr val="tx1"/>
-                </a:solidFill>
-                <a:latin typeface="+mn-lt"/>
-                <a:ea typeface="+mn-ea"/>
-                <a:cs typeface="+mn-cs"/>
-              </a:defRPr>
-            </a:lvl2pPr>
-            <a:lvl3pPr marL="1143000" indent="-228600" algn="l" defTabSz="914400" rtl="0" eaLnBrk="1" latinLnBrk="0" hangingPunct="1">
-              <a:lnSpc>
-                <a:spcPct val="90000"/>
-              </a:lnSpc>
-              <a:spcBef>
-                <a:spcPts val="500"/>
-              </a:spcBef>
-              <a:buFont typeface="Arial" panose="020B0604020202020204" pitchFamily="34" charset="0"/>
-              <a:buChar char="•"/>
-              <a:defRPr sz="2000" kern="1200">
-                <a:solidFill>
-                  <a:schemeClr val="tx1"/>
-                </a:solidFill>
-                <a:latin typeface="+mn-lt"/>
-                <a:ea typeface="+mn-ea"/>
-                <a:cs typeface="+mn-cs"/>
-              </a:defRPr>
-            </a:lvl3pPr>
-            <a:lvl4pPr marL="1600200" indent="-228600" algn="l" defTabSz="914400" rtl="0" eaLnBrk="1" latinLnBrk="0" hangingPunct="1">
-              <a:lnSpc>
-                <a:spcPct val="90000"/>
-              </a:lnSpc>
-              <a:spcBef>
-                <a:spcPts val="500"/>
-              </a:spcBef>
-              <a:buFont typeface="Arial" panose="020B0604020202020204" pitchFamily="34" charset="0"/>
-              <a:buChar char="•"/>
-              <a:defRPr sz="1800" kern="1200">
-                <a:solidFill>
-                  <a:schemeClr val="tx1"/>
-                </a:solidFill>
-                <a:latin typeface="+mn-lt"/>
-                <a:ea typeface="+mn-ea"/>
-                <a:cs typeface="+mn-cs"/>
-              </a:defRPr>
-            </a:lvl4pPr>
-            <a:lvl5pPr marL="2057400" indent="-228600" algn="l" defTabSz="914400" rtl="0" eaLnBrk="1" latinLnBrk="0" hangingPunct="1">
-              <a:lnSpc>
-                <a:spcPct val="90000"/>
-              </a:lnSpc>
-              <a:spcBef>
-                <a:spcPts val="500"/>
-              </a:spcBef>
-              <a:buFont typeface="Arial" panose="020B0604020202020204" pitchFamily="34" charset="0"/>
-              <a:buChar char="•"/>
-              <a:defRPr sz="1800" kern="1200">
-                <a:solidFill>
-                  <a:schemeClr val="tx1"/>
-                </a:solidFill>
-                <a:latin typeface="+mn-lt"/>
-                <a:ea typeface="+mn-ea"/>
-                <a:cs typeface="+mn-cs"/>
-              </a:defRPr>
-            </a:lvl5pPr>
-            <a:lvl6pPr marL="2514600" indent="-228600" algn="l" defTabSz="914400" rtl="0" eaLnBrk="1" latinLnBrk="0" hangingPunct="1">
-              <a:lnSpc>
-                <a:spcPct val="90000"/>
-              </a:lnSpc>
-              <a:spcBef>
-                <a:spcPts val="500"/>
-              </a:spcBef>
-              <a:buFont typeface="Arial" panose="020B0604020202020204" pitchFamily="34" charset="0"/>
-              <a:buChar char="•"/>
-              <a:defRPr sz="1800" kern="1200">
-                <a:solidFill>
-                  <a:schemeClr val="tx1"/>
-                </a:solidFill>
-                <a:latin typeface="+mn-lt"/>
-                <a:ea typeface="+mn-ea"/>
-                <a:cs typeface="+mn-cs"/>
-              </a:defRPr>
-            </a:lvl6pPr>
-            <a:lvl7pPr marL="2971800" indent="-228600" algn="l" defTabSz="914400" rtl="0" eaLnBrk="1" latinLnBrk="0" hangingPunct="1">
-              <a:lnSpc>
-                <a:spcPct val="90000"/>
-              </a:lnSpc>
-              <a:spcBef>
-                <a:spcPts val="500"/>
-              </a:spcBef>
-              <a:buFont typeface="Arial" panose="020B0604020202020204" pitchFamily="34" charset="0"/>
-              <a:buChar char="•"/>
-              <a:defRPr sz="1800" kern="1200">
-                <a:solidFill>
-                  <a:schemeClr val="tx1"/>
-                </a:solidFill>
-                <a:latin typeface="+mn-lt"/>
-                <a:ea typeface="+mn-ea"/>
-                <a:cs typeface="+mn-cs"/>
-              </a:defRPr>
-            </a:lvl7pPr>
-            <a:lvl8pPr marL="3429000" indent="-228600" algn="l" defTabSz="914400" rtl="0" eaLnBrk="1" latinLnBrk="0" hangingPunct="1">
-              <a:lnSpc>
-                <a:spcPct val="90000"/>
-              </a:lnSpc>
-              <a:spcBef>
-                <a:spcPts val="500"/>
-              </a:spcBef>
-              <a:buFont typeface="Arial" panose="020B0604020202020204" pitchFamily="34" charset="0"/>
-              <a:buChar char="•"/>
-              <a:defRPr sz="1800" kern="1200">
-                <a:solidFill>
-                  <a:schemeClr val="tx1"/>
-                </a:solidFill>
-                <a:latin typeface="+mn-lt"/>
-                <a:ea typeface="+mn-ea"/>
-                <a:cs typeface="+mn-cs"/>
-              </a:defRPr>
-            </a:lvl8pPr>
-            <a:lvl9pPr marL="3886200" indent="-228600" algn="l" defTabSz="914400" rtl="0" eaLnBrk="1" latinLnBrk="0" hangingPunct="1">
-              <a:lnSpc>
-                <a:spcPct val="90000"/>
-              </a:lnSpc>
-              <a:spcBef>
-                <a:spcPts val="500"/>
-              </a:spcBef>
-              <a:buFont typeface="Arial" panose="020B0604020202020204" pitchFamily="34" charset="0"/>
-              <a:buChar char="•"/>
-              <a:defRPr sz="1800" kern="1200">
-                <a:solidFill>
-                  <a:schemeClr val="tx1"/>
-                </a:solidFill>
-                <a:latin typeface="+mn-lt"/>
-                <a:ea typeface="+mn-ea"/>
-                <a:cs typeface="+mn-cs"/>
-              </a:defRPr>
-            </a:lvl9pPr>
-          </a:lstStyle>
-          <a:p>
-            <a:pPr>
-              <a:lnSpc>
-                <a:spcPct val="170000"/>
-              </a:lnSpc>
-              <a:spcBef>
-                <a:spcPct val="0"/>
-              </a:spcBef>
-            </a:pPr>
-            <a:r>
-              <a:rPr lang="zh-CN" altLang="en-US" sz="2400" dirty="0">
-                <a:solidFill>
-                  <a:srgbClr val="00B0F0"/>
-                </a:solidFill>
-                <a:latin typeface="幼圆" panose="02010509060101010101" pitchFamily="49" charset="-122"/>
-                <a:ea typeface="幼圆" panose="02010509060101010101" pitchFamily="49" charset="-122"/>
-                <a:cs typeface="+mj-cs"/>
-              </a:rPr>
-              <a:t>高级功能的人工智能算法实践与落地</a:t>
-            </a:r>
-            <a:endParaRPr lang="en-US" altLang="zh-CN" sz="2400" dirty="0">
-              <a:solidFill>
-                <a:srgbClr val="00B0F0"/>
-              </a:solidFill>
-              <a:latin typeface="幼圆" panose="02010509060101010101" pitchFamily="49" charset="-122"/>
-              <a:ea typeface="幼圆" panose="02010509060101010101" pitchFamily="49" charset="-122"/>
-              <a:cs typeface="+mj-cs"/>
-            </a:endParaRPr>
-          </a:p>
-          <a:p>
-            <a:pPr>
-              <a:lnSpc>
-                <a:spcPct val="170000"/>
-              </a:lnSpc>
-              <a:spcBef>
-                <a:spcPct val="0"/>
-              </a:spcBef>
-            </a:pPr>
-            <a:r>
-              <a:rPr lang="zh-CN" altLang="en-US" sz="2400" dirty="0">
-                <a:solidFill>
-                  <a:srgbClr val="00B0F0"/>
-                </a:solidFill>
-                <a:latin typeface="幼圆" panose="02010509060101010101" pitchFamily="49" charset="-122"/>
-                <a:ea typeface="幼圆" panose="02010509060101010101" pitchFamily="49" charset="-122"/>
-                <a:cs typeface="+mj-cs"/>
-              </a:rPr>
-              <a:t>超高并发下的服务弹性挑战</a:t>
-            </a:r>
-            <a:endParaRPr lang="en-US" altLang="zh-CN" sz="2400" dirty="0">
-              <a:solidFill>
-                <a:srgbClr val="00B0F0"/>
-              </a:solidFill>
-              <a:latin typeface="幼圆" panose="02010509060101010101" pitchFamily="49" charset="-122"/>
-              <a:ea typeface="幼圆" panose="02010509060101010101" pitchFamily="49" charset="-122"/>
-              <a:cs typeface="+mj-cs"/>
-            </a:endParaRPr>
-          </a:p>
-          <a:p>
-            <a:pPr>
-              <a:lnSpc>
-                <a:spcPct val="170000"/>
-              </a:lnSpc>
-              <a:spcBef>
-                <a:spcPct val="0"/>
-              </a:spcBef>
-            </a:pPr>
-            <a:r>
-              <a:rPr lang="zh-CN" altLang="en-US" sz="2400" dirty="0">
-                <a:solidFill>
-                  <a:srgbClr val="00B0F0"/>
-                </a:solidFill>
-                <a:latin typeface="幼圆" panose="02010509060101010101" pitchFamily="49" charset="-122"/>
-                <a:ea typeface="幼圆" panose="02010509060101010101" pitchFamily="49" charset="-122"/>
-                <a:cs typeface="+mj-cs"/>
-              </a:rPr>
-              <a:t>完善的缓存数据同步与管理机制，保证最终一致性</a:t>
-            </a:r>
-            <a:endParaRPr lang="en-US" altLang="zh-CN" sz="2400" dirty="0">
-              <a:solidFill>
-                <a:srgbClr val="00B0F0"/>
-              </a:solidFill>
-              <a:latin typeface="幼圆" panose="02010509060101010101" pitchFamily="49" charset="-122"/>
-              <a:ea typeface="幼圆" panose="02010509060101010101" pitchFamily="49" charset="-122"/>
-              <a:cs typeface="+mj-cs"/>
-            </a:endParaRPr>
-          </a:p>
-          <a:p>
-            <a:pPr>
-              <a:lnSpc>
-                <a:spcPct val="170000"/>
-              </a:lnSpc>
-              <a:spcBef>
-                <a:spcPct val="0"/>
-              </a:spcBef>
-            </a:pPr>
-            <a:r>
-              <a:rPr lang="en-US" altLang="zh-CN" sz="2400" dirty="0">
-                <a:solidFill>
-                  <a:srgbClr val="00B0F0"/>
-                </a:solidFill>
-                <a:latin typeface="幼圆" panose="02010509060101010101" pitchFamily="49" charset="-122"/>
-                <a:ea typeface="幼圆" panose="02010509060101010101" pitchFamily="49" charset="-122"/>
-                <a:cs typeface="+mj-cs"/>
-              </a:rPr>
-              <a:t>……</a:t>
-            </a:r>
-          </a:p>
-          <a:p>
-            <a:endParaRPr lang="zh-CN" altLang="en-US" dirty="0"/>
-          </a:p>
-        </p:txBody>
-      </p:sp>
-    </p:spTree>
-    <p:extLst>
-      <p:ext uri="{BB962C8B-B14F-4D97-AF65-F5344CB8AC3E}">
-        <p14:creationId xmlns:p14="http://schemas.microsoft.com/office/powerpoint/2010/main" val="3204472853"/>
       </p:ext>
     </p:extLst>
   </p:cSld>

</xml_diff>